<commit_message>
fix test case description (replace "name" with "idenfification code")
</commit_message>
<xml_diff>
--- a/tests/C06 Tank in PlantStructure/C06V01.pptx
+++ b/tests/C06 Tank in PlantStructure/C06V01.pptx
@@ -3154,7 +3154,15 @@
             </a:r>
             <a:r>
               <a:rPr lang="de-DE" dirty="0" err="1" smtClean="0"/>
-              <a:t>name</a:t>
+              <a:t>identification</a:t>
+            </a:r>
+            <a:r>
+              <a:rPr lang="de-DE" dirty="0" smtClean="0"/>
+              <a:t> </a:t>
+            </a:r>
+            <a:r>
+              <a:rPr lang="de-DE" dirty="0" err="1" smtClean="0"/>
+              <a:t>code</a:t>
             </a:r>
             <a:r>
               <a:rPr lang="de-DE" dirty="0" smtClean="0"/>
@@ -3224,11 +3232,23 @@
             </a:r>
             <a:r>
               <a:rPr lang="de-DE" dirty="0" err="1" smtClean="0"/>
-              <a:t>name</a:t>
-            </a:r>
-            <a:r>
-              <a:rPr lang="de-DE" dirty="0" smtClean="0"/>
-              <a:t> „ABC Plant“</a:t>
+              <a:t>identification</a:t>
+            </a:r>
+            <a:r>
+              <a:rPr lang="de-DE" dirty="0" smtClean="0"/>
+              <a:t> </a:t>
+            </a:r>
+            <a:r>
+              <a:rPr lang="de-DE" dirty="0" err="1" smtClean="0"/>
+              <a:t>code</a:t>
+            </a:r>
+            <a:r>
+              <a:rPr lang="de-DE" dirty="0" smtClean="0"/>
+              <a:t> </a:t>
+            </a:r>
+            <a:r>
+              <a:rPr lang="de-DE" dirty="0" smtClean="0"/>
+              <a:t>„ABC Plant“</a:t>
             </a:r>
           </a:p>
           <a:p>
@@ -3278,11 +3298,23 @@
             </a:r>
             <a:r>
               <a:rPr lang="de-DE" dirty="0" err="1" smtClean="0"/>
-              <a:t>name</a:t>
-            </a:r>
-            <a:r>
-              <a:rPr lang="de-DE" dirty="0" smtClean="0"/>
-              <a:t> „DEXPI Site“.</a:t>
+              <a:t>identification</a:t>
+            </a:r>
+            <a:r>
+              <a:rPr lang="de-DE" dirty="0" smtClean="0"/>
+              <a:t> </a:t>
+            </a:r>
+            <a:r>
+              <a:rPr lang="de-DE" dirty="0" err="1" smtClean="0"/>
+              <a:t>code</a:t>
+            </a:r>
+            <a:r>
+              <a:rPr lang="de-DE" dirty="0" smtClean="0"/>
+              <a:t> </a:t>
+            </a:r>
+            <a:r>
+              <a:rPr lang="de-DE" dirty="0" smtClean="0"/>
+              <a:t>„DEXPI Site“.</a:t>
             </a:r>
           </a:p>
           <a:p>
@@ -3327,11 +3359,23 @@
             </a:r>
             <a:r>
               <a:rPr lang="de-DE" dirty="0" err="1" smtClean="0"/>
-              <a:t>name</a:t>
-            </a:r>
-            <a:r>
-              <a:rPr lang="de-DE" dirty="0" smtClean="0"/>
-              <a:t> „Train 2“.</a:t>
+              <a:t>identification</a:t>
+            </a:r>
+            <a:r>
+              <a:rPr lang="de-DE" dirty="0" smtClean="0"/>
+              <a:t> </a:t>
+            </a:r>
+            <a:r>
+              <a:rPr lang="de-DE" dirty="0" err="1" smtClean="0"/>
+              <a:t>code</a:t>
+            </a:r>
+            <a:r>
+              <a:rPr lang="de-DE" dirty="0" smtClean="0"/>
+              <a:t> </a:t>
+            </a:r>
+            <a:r>
+              <a:rPr lang="de-DE" dirty="0" smtClean="0"/>
+              <a:t>„Train 2“.</a:t>
             </a:r>
             <a:endParaRPr lang="de-DE" dirty="0" smtClean="0"/>
           </a:p>

</xml_diff>